<commit_message>
Limit slides to 15 and connect frontend to local backend
</commit_message>
<xml_diff>
--- a/generated_ppt/wild_animals.pptx
+++ b/generated_ppt/wild_animals.pptx
@@ -13,6 +13,14 @@
     <p:sldId id="261" r:id="rId12"/>
     <p:sldId id="262" r:id="rId13"/>
     <p:sldId id="263" r:id="rId14"/>
+    <p:sldId id="264" r:id="rId15"/>
+    <p:sldId id="265" r:id="rId16"/>
+    <p:sldId id="266" r:id="rId17"/>
+    <p:sldId id="267" r:id="rId18"/>
+    <p:sldId id="268" r:id="rId19"/>
+    <p:sldId id="269" r:id="rId20"/>
+    <p:sldId id="270" r:id="rId21"/>
+    <p:sldId id="271" r:id="rId22"/>
   </p:sldIdLst>
   <p:sldSz cx="9144000" cy="6858000" type="screen4x3"/>
   <p:notesSz cx="6858000" cy="9144000"/>
@@ -3190,9 +3198,856 @@
               <a:defRPr sz="1900"/>
             </a:pPr>
             <a:r>
-              <a:t>Wild animals are an integral part of our ecosystem, playing a crucial role in maintaining the balance of nature. The preservation of wild animals is essential for the health of our planet, as they contribute to seed dispersal, pollination, and nutrient cycling...</a:t>
-            </a:r>
-          </a:p>
+              <a:t>Wild animals are an integral part of our ecosystem, playing a crucial role in maintaining the balance of nature. These animals have adapted to survive in various environments, from the freezing tundra to the scorching deserts...</a:t>
+            </a:r>
+          </a:p>
+        </p:txBody>
+      </p:sp>
+    </p:spTree>
+  </p:cSld>
+  <p:clrMapOvr>
+    <a:masterClrMapping/>
+  </p:clrMapOvr>
+</p:sld>
+</file>
+
+<file path=ppt/slides/slide10.xml><?xml version="1.0" encoding="utf-8"?>
+<p:sld xmlns:a="http://schemas.openxmlformats.org/drawingml/2006/main" xmlns:p="http://schemas.openxmlformats.org/presentationml/2006/main" xmlns:r="http://schemas.openxmlformats.org/officeDocument/2006/relationships">
+  <p:cSld>
+    <p:spTree>
+      <p:nvGrpSpPr>
+        <p:cNvPr id="1" name=""/>
+        <p:cNvGrpSpPr/>
+        <p:nvPr/>
+      </p:nvGrpSpPr>
+      <p:grpSpPr/>
+      <p:sp>
+        <p:nvSpPr>
+          <p:cNvPr id="2" name="TextBox 1"/>
+          <p:cNvSpPr txBox="1"/>
+          <p:nvPr/>
+        </p:nvSpPr>
+        <p:spPr>
+          <a:xfrm>
+            <a:off x="457200" y="365760"/>
+            <a:ext cx="8229600" cy="822960"/>
+          </a:xfrm>
+          <a:prstGeom prst="rect">
+            <a:avLst/>
+          </a:prstGeom>
+          <a:noFill/>
+        </p:spPr>
+        <p:txBody>
+          <a:bodyPr wrap="none">
+            <a:noAutofit/>
+          </a:bodyPr>
+          <a:lstStyle/>
+          <a:p>
+            <a:pPr>
+              <a:defRPr sz="2600" b="1"/>
+            </a:pPr>
+            <a:r>
+              <a:t>Research and Monitoring</a:t>
+            </a:r>
+          </a:p>
+        </p:txBody>
+      </p:sp>
+      <p:sp>
+        <p:nvSpPr>
+          <p:cNvPr id="3" name="TextBox 2"/>
+          <p:cNvSpPr txBox="1"/>
+          <p:nvPr/>
+        </p:nvSpPr>
+        <p:spPr>
+          <a:xfrm>
+            <a:off x="640080" y="1463040"/>
+            <a:ext cx="7863840" cy="4389120"/>
+          </a:xfrm>
+          <a:prstGeom prst="rect">
+            <a:avLst/>
+          </a:prstGeom>
+          <a:noFill/>
+        </p:spPr>
+        <p:txBody>
+          <a:bodyPr wrap="square">
+            <a:noAutofit/>
+          </a:bodyPr>
+          <a:lstStyle/>
+          <a:p/>
+          <a:p>
+            <a:pPr>
+              <a:lnSpc>
+                <a:spcPct val="115000"/>
+              </a:lnSpc>
+              <a:spcAft>
+                <a:spcPts val="600"/>
+              </a:spcAft>
+              <a:defRPr sz="2000"/>
+            </a:pPr>
+            <a:r>
+              <a:t>• Scientific research and monitoring are essential for understanding the behavior, ecology, and conservation status of wild animals.</a:t>
+            </a:r>
+          </a:p>
+          <a:p>
+            <a:pPr>
+              <a:lnSpc>
+                <a:spcPct val="115000"/>
+              </a:lnSpc>
+              <a:spcAft>
+                <a:spcPts val="600"/>
+              </a:spcAft>
+              <a:defRPr sz="2000"/>
+            </a:pPr>
+            <a:r>
+              <a:t>• Techniques such as camera trapping, satellite tracking, and genetic analysis provide valuable insights into the lives of wild animals.</a:t>
+            </a:r>
+          </a:p>
+          <a:p>
+            <a:pPr>
+              <a:lnSpc>
+                <a:spcPct val="115000"/>
+              </a:lnSpc>
+              <a:spcAft>
+                <a:spcPts val="600"/>
+              </a:spcAft>
+              <a:defRPr sz="2000"/>
+            </a:pPr>
+            <a:r>
+              <a:t>• Long-term monitoring of wild animal populations helps to identify trends and patterns, informing effective conservation strategies.</a:t>
+            </a:r>
+          </a:p>
+          <a:p>
+            <a:pPr>
+              <a:lnSpc>
+                <a:spcPct val="115000"/>
+              </a:lnSpc>
+              <a:spcAft>
+                <a:spcPts val="600"/>
+              </a:spcAft>
+              <a:defRPr sz="2000"/>
+            </a:pPr>
+            <a:r>
+              <a:t>• The application of research and monitoring results can significantly improve the management and conservation of wild animals.</a:t>
+            </a:r>
+          </a:p>
+        </p:txBody>
+      </p:sp>
+    </p:spTree>
+  </p:cSld>
+  <p:clrMapOvr>
+    <a:masterClrMapping/>
+  </p:clrMapOvr>
+</p:sld>
+</file>
+
+<file path=ppt/slides/slide11.xml><?xml version="1.0" encoding="utf-8"?>
+<p:sld xmlns:a="http://schemas.openxmlformats.org/drawingml/2006/main" xmlns:p="http://schemas.openxmlformats.org/presentationml/2006/main" xmlns:r="http://schemas.openxmlformats.org/officeDocument/2006/relationships">
+  <p:cSld>
+    <p:spTree>
+      <p:nvGrpSpPr>
+        <p:cNvPr id="1" name=""/>
+        <p:cNvGrpSpPr/>
+        <p:nvPr/>
+      </p:nvGrpSpPr>
+      <p:grpSpPr/>
+      <p:sp>
+        <p:nvSpPr>
+          <p:cNvPr id="2" name="TextBox 1"/>
+          <p:cNvSpPr txBox="1"/>
+          <p:nvPr/>
+        </p:nvSpPr>
+        <p:spPr>
+          <a:xfrm>
+            <a:off x="365760" y="274320"/>
+            <a:ext cx="8229600" cy="731520"/>
+          </a:xfrm>
+          <a:prstGeom prst="rect">
+            <a:avLst/>
+          </a:prstGeom>
+          <a:noFill/>
+        </p:spPr>
+        <p:txBody>
+          <a:bodyPr wrap="none">
+            <a:spAutoFit/>
+          </a:bodyPr>
+          <a:lstStyle/>
+          <a:p>
+            <a:pPr>
+              <a:defRPr sz="2800" b="1"/>
+            </a:pPr>
+            <a:r>
+              <a:t>Education and Awareness</a:t>
+            </a:r>
+          </a:p>
+        </p:txBody>
+      </p:sp>
+      <p:sp>
+        <p:nvSpPr>
+          <p:cNvPr id="3" name="TextBox 2"/>
+          <p:cNvSpPr txBox="1"/>
+          <p:nvPr/>
+        </p:nvSpPr>
+        <p:spPr>
+          <a:xfrm>
+            <a:off x="365760" y="1097280"/>
+            <a:ext cx="3840480" cy="4114800"/>
+          </a:xfrm>
+          <a:prstGeom prst="rect">
+            <a:avLst/>
+          </a:prstGeom>
+          <a:noFill/>
+        </p:spPr>
+        <p:txBody>
+          <a:bodyPr wrap="square">
+            <a:spAutoFit/>
+          </a:bodyPr>
+          <a:lstStyle/>
+          <a:p/>
+          <a:p>
+            <a:pPr>
+              <a:defRPr sz="1600"/>
+            </a:pPr>
+            <a:r>
+              <a:t>• Education and awareness are critical components of wild animal conservation, as they promote a culture of appreciation and respect.</a:t>
+            </a:r>
+          </a:p>
+          <a:p>
+            <a:pPr>
+              <a:defRPr sz="1600"/>
+            </a:pPr>
+            <a:r>
+              <a:t>• Educational programs, such as wildlife workshops and conservation camps, can inspire people to take action and make a positive impact.</a:t>
+            </a:r>
+          </a:p>
+          <a:p>
+            <a:pPr>
+              <a:defRPr sz="1600"/>
+            </a:pPr>
+            <a:r>
+              <a:t>• Raising awareness about the importance of wild animals and the threats they face can motivate individuals to support conservation efforts.</a:t>
+            </a:r>
+          </a:p>
+          <a:p>
+            <a:pPr>
+              <a:defRPr sz="1600"/>
+            </a:pPr>
+            <a:r>
+              <a:t>• Empowering people with knowledge and inspiring them to care about wild animals can lead to a significant increase in conservation efforts.</a:t>
+            </a:r>
+          </a:p>
+        </p:txBody>
+      </p:sp>
+      <p:pic>
+        <p:nvPicPr>
+          <p:cNvPr id="4" name="Picture 3" descr="image.jpg"/>
+          <p:cNvPicPr>
+            <a:picLocks noChangeAspect="1"/>
+          </p:cNvPicPr>
+          <p:nvPr/>
+        </p:nvPicPr>
+        <p:blipFill>
+          <a:blip r:embed="rId2"/>
+          <a:stretch>
+            <a:fillRect/>
+          </a:stretch>
+        </p:blipFill>
+        <p:spPr>
+          <a:xfrm>
+            <a:off x="4937760" y="1097280"/>
+            <a:ext cx="3657600" cy="2433280"/>
+          </a:xfrm>
+          <a:prstGeom prst="rect">
+            <a:avLst/>
+          </a:prstGeom>
+        </p:spPr>
+      </p:pic>
+    </p:spTree>
+  </p:cSld>
+  <p:clrMapOvr>
+    <a:masterClrMapping/>
+  </p:clrMapOvr>
+</p:sld>
+</file>
+
+<file path=ppt/slides/slide12.xml><?xml version="1.0" encoding="utf-8"?>
+<p:sld xmlns:a="http://schemas.openxmlformats.org/drawingml/2006/main" xmlns:p="http://schemas.openxmlformats.org/presentationml/2006/main" xmlns:r="http://schemas.openxmlformats.org/officeDocument/2006/relationships">
+  <p:cSld>
+    <p:spTree>
+      <p:nvGrpSpPr>
+        <p:cNvPr id="1" name=""/>
+        <p:cNvGrpSpPr/>
+        <p:nvPr/>
+      </p:nvGrpSpPr>
+      <p:grpSpPr/>
+      <p:sp>
+        <p:nvSpPr>
+          <p:cNvPr id="2" name="TextBox 1"/>
+          <p:cNvSpPr txBox="1"/>
+          <p:nvPr/>
+        </p:nvSpPr>
+        <p:spPr>
+          <a:xfrm>
+            <a:off x="457200" y="365760"/>
+            <a:ext cx="8229600" cy="822960"/>
+          </a:xfrm>
+          <a:prstGeom prst="rect">
+            <a:avLst/>
+          </a:prstGeom>
+          <a:noFill/>
+        </p:spPr>
+        <p:txBody>
+          <a:bodyPr wrap="none">
+            <a:noAutofit/>
+          </a:bodyPr>
+          <a:lstStyle/>
+          <a:p>
+            <a:pPr>
+              <a:defRPr sz="2600" b="1"/>
+            </a:pPr>
+            <a:r>
+              <a:t>Community Engagement</a:t>
+            </a:r>
+          </a:p>
+        </p:txBody>
+      </p:sp>
+      <p:sp>
+        <p:nvSpPr>
+          <p:cNvPr id="3" name="TextBox 2"/>
+          <p:cNvSpPr txBox="1"/>
+          <p:nvPr/>
+        </p:nvSpPr>
+        <p:spPr>
+          <a:xfrm>
+            <a:off x="640080" y="1463040"/>
+            <a:ext cx="7863840" cy="4389120"/>
+          </a:xfrm>
+          <a:prstGeom prst="rect">
+            <a:avLst/>
+          </a:prstGeom>
+          <a:noFill/>
+        </p:spPr>
+        <p:txBody>
+          <a:bodyPr wrap="square">
+            <a:noAutofit/>
+          </a:bodyPr>
+          <a:lstStyle/>
+          <a:p/>
+          <a:p>
+            <a:pPr>
+              <a:lnSpc>
+                <a:spcPct val="115000"/>
+              </a:lnSpc>
+              <a:spcAft>
+                <a:spcPts val="600"/>
+              </a:spcAft>
+              <a:defRPr sz="2000"/>
+            </a:pPr>
+            <a:r>
+              <a:t>• Community engagement is vital for the success of wild animal conservation efforts, as it fosters a sense of ownership and responsibility.</a:t>
+            </a:r>
+          </a:p>
+          <a:p>
+            <a:pPr>
+              <a:lnSpc>
+                <a:spcPct val="115000"/>
+              </a:lnSpc>
+              <a:spcAft>
+                <a:spcPts val="600"/>
+              </a:spcAft>
+              <a:defRPr sz="2000"/>
+            </a:pPr>
+            <a:r>
+              <a:t>• Involving local communities in conservation initiatives can help to address human-wildlife conflict and promote coexistence.</a:t>
+            </a:r>
+          </a:p>
+          <a:p>
+            <a:pPr>
+              <a:lnSpc>
+                <a:spcPct val="115000"/>
+              </a:lnSpc>
+              <a:spcAft>
+                <a:spcPts val="600"/>
+              </a:spcAft>
+              <a:defRPr sz="2000"/>
+            </a:pPr>
+            <a:r>
+              <a:t>• Supporting community-based conservation projects can provide economic benefits and improve livelihoods, while also protecting wild animals and their habitats.</a:t>
+            </a:r>
+          </a:p>
+          <a:p>
+            <a:pPr>
+              <a:lnSpc>
+                <a:spcPct val="115000"/>
+              </a:lnSpc>
+              <a:spcAft>
+                <a:spcPts val="600"/>
+              </a:spcAft>
+              <a:defRPr sz="2000"/>
+            </a:pPr>
+            <a:r>
+              <a:t>• Community engagement is essential for building a strong foundation for long-term conservation success.</a:t>
+            </a:r>
+          </a:p>
+        </p:txBody>
+      </p:sp>
+    </p:spTree>
+  </p:cSld>
+  <p:clrMapOvr>
+    <a:masterClrMapping/>
+  </p:clrMapOvr>
+</p:sld>
+</file>
+
+<file path=ppt/slides/slide13.xml><?xml version="1.0" encoding="utf-8"?>
+<p:sld xmlns:a="http://schemas.openxmlformats.org/drawingml/2006/main" xmlns:p="http://schemas.openxmlformats.org/presentationml/2006/main" xmlns:r="http://schemas.openxmlformats.org/officeDocument/2006/relationships">
+  <p:cSld>
+    <p:spTree>
+      <p:nvGrpSpPr>
+        <p:cNvPr id="1" name=""/>
+        <p:cNvGrpSpPr/>
+        <p:nvPr/>
+      </p:nvGrpSpPr>
+      <p:grpSpPr/>
+      <p:sp>
+        <p:nvSpPr>
+          <p:cNvPr id="2" name="TextBox 1"/>
+          <p:cNvSpPr txBox="1"/>
+          <p:nvPr/>
+        </p:nvSpPr>
+        <p:spPr>
+          <a:xfrm>
+            <a:off x="457200" y="365760"/>
+            <a:ext cx="8229600" cy="822960"/>
+          </a:xfrm>
+          <a:prstGeom prst="rect">
+            <a:avLst/>
+          </a:prstGeom>
+          <a:noFill/>
+        </p:spPr>
+        <p:txBody>
+          <a:bodyPr wrap="none">
+            <a:noAutofit/>
+          </a:bodyPr>
+          <a:lstStyle/>
+          <a:p>
+            <a:pPr>
+              <a:defRPr sz="2600" b="1"/>
+            </a:pPr>
+            <a:r>
+              <a:t>Policy and Legislation</a:t>
+            </a:r>
+          </a:p>
+        </p:txBody>
+      </p:sp>
+      <p:sp>
+        <p:nvSpPr>
+          <p:cNvPr id="3" name="TextBox 2"/>
+          <p:cNvSpPr txBox="1"/>
+          <p:nvPr/>
+        </p:nvSpPr>
+        <p:spPr>
+          <a:xfrm>
+            <a:off x="640080" y="1463040"/>
+            <a:ext cx="7863840" cy="4389120"/>
+          </a:xfrm>
+          <a:prstGeom prst="rect">
+            <a:avLst/>
+          </a:prstGeom>
+          <a:noFill/>
+        </p:spPr>
+        <p:txBody>
+          <a:bodyPr wrap="square">
+            <a:noAutofit/>
+          </a:bodyPr>
+          <a:lstStyle/>
+          <a:p/>
+          <a:p>
+            <a:pPr>
+              <a:lnSpc>
+                <a:spcPct val="115000"/>
+              </a:lnSpc>
+              <a:spcAft>
+                <a:spcPts val="600"/>
+              </a:spcAft>
+              <a:defRPr sz="2000"/>
+            </a:pPr>
+            <a:r>
+              <a:t>• Effective policy and legislation are necessary for protecting wild animals and their habitats, as they provide a framework for conservation efforts.</a:t>
+            </a:r>
+          </a:p>
+          <a:p>
+            <a:pPr>
+              <a:lnSpc>
+                <a:spcPct val="115000"/>
+              </a:lnSpc>
+              <a:spcAft>
+                <a:spcPts val="600"/>
+              </a:spcAft>
+              <a:defRPr sz="2000"/>
+            </a:pPr>
+            <a:r>
+              <a:t>• Laws and regulations, such as the Endangered Species Act, can help to prevent habitat destruction, reduce pollution, and combat wildlife trafficking.</a:t>
+            </a:r>
+          </a:p>
+          <a:p>
+            <a:pPr>
+              <a:lnSpc>
+                <a:spcPct val="115000"/>
+              </a:lnSpc>
+              <a:spcAft>
+                <a:spcPts val="600"/>
+              </a:spcAft>
+              <a:defRPr sz="2000"/>
+            </a:pPr>
+            <a:r>
+              <a:t>• International cooperation and agreements, like the Convention on International Trade in Endangered Species of Wild Fauna and Flora, are crucial for addressing global conservation challenges.</a:t>
+            </a:r>
+          </a:p>
+          <a:p>
+            <a:pPr>
+              <a:lnSpc>
+                <a:spcPct val="115000"/>
+              </a:lnSpc>
+              <a:spcAft>
+                <a:spcPts val="600"/>
+              </a:spcAft>
+              <a:defRPr sz="2000"/>
+            </a:pPr>
+            <a:r>
+              <a:t>• The development and implementation of conservation policies and laws require a collaborative effort from governments, organizations, and individuals.</a:t>
+            </a:r>
+          </a:p>
+        </p:txBody>
+      </p:sp>
+    </p:spTree>
+  </p:cSld>
+  <p:clrMapOvr>
+    <a:masterClrMapping/>
+  </p:clrMapOvr>
+</p:sld>
+</file>
+
+<file path=ppt/slides/slide14.xml><?xml version="1.0" encoding="utf-8"?>
+<p:sld xmlns:a="http://schemas.openxmlformats.org/drawingml/2006/main" xmlns:p="http://schemas.openxmlformats.org/presentationml/2006/main" xmlns:r="http://schemas.openxmlformats.org/officeDocument/2006/relationships">
+  <p:cSld>
+    <p:spTree>
+      <p:nvGrpSpPr>
+        <p:cNvPr id="1" name=""/>
+        <p:cNvGrpSpPr/>
+        <p:nvPr/>
+      </p:nvGrpSpPr>
+      <p:grpSpPr/>
+      <p:sp>
+        <p:nvSpPr>
+          <p:cNvPr id="2" name="TextBox 1"/>
+          <p:cNvSpPr txBox="1"/>
+          <p:nvPr/>
+        </p:nvSpPr>
+        <p:spPr>
+          <a:xfrm>
+            <a:off x="365760" y="274320"/>
+            <a:ext cx="8229600" cy="731520"/>
+          </a:xfrm>
+          <a:prstGeom prst="rect">
+            <a:avLst/>
+          </a:prstGeom>
+          <a:noFill/>
+        </p:spPr>
+        <p:txBody>
+          <a:bodyPr wrap="none">
+            <a:spAutoFit/>
+          </a:bodyPr>
+          <a:lstStyle/>
+          <a:p>
+            <a:pPr>
+              <a:defRPr sz="2800" b="1"/>
+            </a:pPr>
+            <a:r>
+              <a:t>Conclusion</a:t>
+            </a:r>
+          </a:p>
+        </p:txBody>
+      </p:sp>
+      <p:sp>
+        <p:nvSpPr>
+          <p:cNvPr id="3" name="TextBox 2"/>
+          <p:cNvSpPr txBox="1"/>
+          <p:nvPr/>
+        </p:nvSpPr>
+        <p:spPr>
+          <a:xfrm>
+            <a:off x="365760" y="1097280"/>
+            <a:ext cx="3840480" cy="4114800"/>
+          </a:xfrm>
+          <a:prstGeom prst="rect">
+            <a:avLst/>
+          </a:prstGeom>
+          <a:noFill/>
+        </p:spPr>
+        <p:txBody>
+          <a:bodyPr wrap="square">
+            <a:spAutoFit/>
+          </a:bodyPr>
+          <a:lstStyle/>
+          <a:p/>
+          <a:p>
+            <a:pPr>
+              <a:defRPr sz="1600"/>
+            </a:pPr>
+            <a:r>
+              <a:t>• Wild animals are a vital component of our planet's ecosystem, and their conservation is essential for maintaining biodiversity and ecosystem services.</a:t>
+            </a:r>
+          </a:p>
+          <a:p>
+            <a:pPr>
+              <a:defRPr sz="1600"/>
+            </a:pPr>
+            <a:r>
+              <a:t>• Addressing the challenges facing wild animals requires a comprehensive approach that involves research, conservation, education, and community engagement.</a:t>
+            </a:r>
+          </a:p>
+          <a:p>
+            <a:pPr>
+              <a:defRPr sz="1600"/>
+            </a:pPr>
+            <a:r>
+              <a:t>• By working together, we can protect wild animals, preserve their habitats, and ensure the long-term health of our planet.</a:t>
+            </a:r>
+          </a:p>
+          <a:p>
+            <a:pPr>
+              <a:defRPr sz="1600"/>
+            </a:pPr>
+            <a:r>
+              <a:t>• The future of wild animals depends on our ability to take action and make a positive impact on their lives and habitats.</a:t>
+            </a:r>
+          </a:p>
+        </p:txBody>
+      </p:sp>
+      <p:pic>
+        <p:nvPicPr>
+          <p:cNvPr id="4" name="Picture 3" descr="image.jpg"/>
+          <p:cNvPicPr>
+            <a:picLocks noChangeAspect="1"/>
+          </p:cNvPicPr>
+          <p:nvPr/>
+        </p:nvPicPr>
+        <p:blipFill>
+          <a:blip r:embed="rId2"/>
+          <a:stretch>
+            <a:fillRect/>
+          </a:stretch>
+        </p:blipFill>
+        <p:spPr>
+          <a:xfrm>
+            <a:off x="4937760" y="1097280"/>
+            <a:ext cx="3657600" cy="3089853"/>
+          </a:xfrm>
+          <a:prstGeom prst="rect">
+            <a:avLst/>
+          </a:prstGeom>
+        </p:spPr>
+      </p:pic>
+    </p:spTree>
+  </p:cSld>
+  <p:clrMapOvr>
+    <a:masterClrMapping/>
+  </p:clrMapOvr>
+</p:sld>
+</file>
+
+<file path=ppt/slides/slide15.xml><?xml version="1.0" encoding="utf-8"?>
+<p:sld xmlns:a="http://schemas.openxmlformats.org/drawingml/2006/main" xmlns:p="http://schemas.openxmlformats.org/presentationml/2006/main" xmlns:r="http://schemas.openxmlformats.org/officeDocument/2006/relationships">
+  <p:cSld>
+    <p:spTree>
+      <p:nvGrpSpPr>
+        <p:cNvPr id="1" name=""/>
+        <p:cNvGrpSpPr/>
+        <p:nvPr/>
+      </p:nvGrpSpPr>
+      <p:grpSpPr/>
+      <p:sp>
+        <p:nvSpPr>
+          <p:cNvPr id="2" name="TextBox 1"/>
+          <p:cNvSpPr txBox="1"/>
+          <p:nvPr/>
+        </p:nvSpPr>
+        <p:spPr>
+          <a:xfrm>
+            <a:off x="457200" y="365760"/>
+            <a:ext cx="8229600" cy="822960"/>
+          </a:xfrm>
+          <a:prstGeom prst="rect">
+            <a:avLst/>
+          </a:prstGeom>
+          <a:noFill/>
+        </p:spPr>
+        <p:txBody>
+          <a:bodyPr wrap="none">
+            <a:noAutofit/>
+          </a:bodyPr>
+          <a:lstStyle/>
+          <a:p>
+            <a:pPr>
+              <a:defRPr sz="2600" b="1"/>
+            </a:pPr>
+            <a:r>
+              <a:t>Call to Action</a:t>
+            </a:r>
+          </a:p>
+        </p:txBody>
+      </p:sp>
+      <p:sp>
+        <p:nvSpPr>
+          <p:cNvPr id="3" name="TextBox 2"/>
+          <p:cNvSpPr txBox="1"/>
+          <p:nvPr/>
+        </p:nvSpPr>
+        <p:spPr>
+          <a:xfrm>
+            <a:off x="640080" y="1463040"/>
+            <a:ext cx="7863840" cy="4389120"/>
+          </a:xfrm>
+          <a:prstGeom prst="rect">
+            <a:avLst/>
+          </a:prstGeom>
+          <a:noFill/>
+        </p:spPr>
+        <p:txBody>
+          <a:bodyPr wrap="square">
+            <a:noAutofit/>
+          </a:bodyPr>
+          <a:lstStyle/>
+          <a:p/>
+          <a:p>
+            <a:pPr>
+              <a:lnSpc>
+                <a:spcPct val="115000"/>
+              </a:lnSpc>
+              <a:spcAft>
+                <a:spcPts val="600"/>
+              </a:spcAft>
+              <a:defRPr sz="2000"/>
+            </a:pPr>
+            <a:r>
+              <a:t>• We must take immediate action to protect wild animals and their habitats, as the consequences of inaction will be severe and far-reaching.</a:t>
+            </a:r>
+          </a:p>
+          <a:p>
+            <a:pPr>
+              <a:lnSpc>
+                <a:spcPct val="115000"/>
+              </a:lnSpc>
+              <a:spcAft>
+                <a:spcPts val="600"/>
+              </a:spcAft>
+              <a:defRPr sz="2000"/>
+            </a:pPr>
+            <a:r>
+              <a:t>• Individuals, organizations, and governments must work together to address the complex challenges facing wild animals.</a:t>
+            </a:r>
+          </a:p>
+          <a:p>
+            <a:pPr>
+              <a:lnSpc>
+                <a:spcPct val="115000"/>
+              </a:lnSpc>
+              <a:spcAft>
+                <a:spcPts val="600"/>
+              </a:spcAft>
+              <a:defRPr sz="2000"/>
+            </a:pPr>
+            <a:r>
+              <a:t>• By supporting conservation efforts, reducing our environmental impact, and promoting coexistence with wild animals, we can make a significant difference.</a:t>
+            </a:r>
+          </a:p>
+          <a:p>
+            <a:pPr>
+              <a:lnSpc>
+                <a:spcPct val="115000"/>
+              </a:lnSpc>
+              <a:spcAft>
+                <a:spcPts val="600"/>
+              </a:spcAft>
+              <a:defRPr sz="2000"/>
+            </a:pPr>
+            <a:r>
+              <a:t>• The time to act is now, and our collective efforts can help to ensure the survival of wild animals and the preservation of ecosystem balance.</a:t>
+            </a:r>
+          </a:p>
+        </p:txBody>
+      </p:sp>
+    </p:spTree>
+  </p:cSld>
+  <p:clrMapOvr>
+    <a:masterClrMapping/>
+  </p:clrMapOvr>
+</p:sld>
+</file>
+
+<file path=ppt/slides/slide16.xml><?xml version="1.0" encoding="utf-8"?>
+<p:sld xmlns:a="http://schemas.openxmlformats.org/drawingml/2006/main" xmlns:p="http://schemas.openxmlformats.org/presentationml/2006/main" xmlns:r="http://schemas.openxmlformats.org/officeDocument/2006/relationships">
+  <p:cSld>
+    <p:spTree>
+      <p:nvGrpSpPr>
+        <p:cNvPr id="1" name=""/>
+        <p:cNvGrpSpPr/>
+        <p:nvPr/>
+      </p:nvGrpSpPr>
+      <p:grpSpPr/>
+      <p:sp>
+        <p:nvSpPr>
+          <p:cNvPr id="2" name="TextBox 1"/>
+          <p:cNvSpPr txBox="1"/>
+          <p:nvPr/>
+        </p:nvSpPr>
+        <p:spPr>
+          <a:xfrm>
+            <a:off x="457200" y="365760"/>
+            <a:ext cx="8229600" cy="822960"/>
+          </a:xfrm>
+          <a:prstGeom prst="rect">
+            <a:avLst/>
+          </a:prstGeom>
+          <a:noFill/>
+        </p:spPr>
+        <p:txBody>
+          <a:bodyPr wrap="none">
+            <a:noAutofit/>
+          </a:bodyPr>
+          <a:lstStyle/>
+          <a:p>
+            <a:pPr>
+              <a:defRPr sz="2600" b="1"/>
+            </a:pPr>
+            <a:r>
+              <a:t>Thank You</a:t>
+            </a:r>
+          </a:p>
+        </p:txBody>
+      </p:sp>
+      <p:sp>
+        <p:nvSpPr>
+          <p:cNvPr id="3" name="TextBox 2"/>
+          <p:cNvSpPr txBox="1"/>
+          <p:nvPr/>
+        </p:nvSpPr>
+        <p:spPr>
+          <a:xfrm>
+            <a:off x="640080" y="1463040"/>
+            <a:ext cx="7863840" cy="4389120"/>
+          </a:xfrm>
+          <a:prstGeom prst="rect">
+            <a:avLst/>
+          </a:prstGeom>
+          <a:noFill/>
+        </p:spPr>
+        <p:txBody>
+          <a:bodyPr wrap="square">
+            <a:noAutofit/>
+          </a:bodyPr>
+          <a:lstStyle/>
+          <a:p/>
         </p:txBody>
       </p:sp>
     </p:spTree>
@@ -3221,8 +4076,8 @@
         </p:nvSpPr>
         <p:spPr>
           <a:xfrm>
-            <a:off x="457200" y="365760"/>
-            <a:ext cx="8229600" cy="822960"/>
+            <a:off x="365760" y="274320"/>
+            <a:ext cx="8229600" cy="731520"/>
           </a:xfrm>
           <a:prstGeom prst="rect">
             <a:avLst/>
@@ -3231,12 +4086,12 @@
         </p:spPr>
         <p:txBody>
           <a:bodyPr wrap="none">
-            <a:noAutofit/>
+            <a:spAutoFit/>
           </a:bodyPr>
           <a:lstStyle/>
           <a:p>
             <a:pPr>
-              <a:defRPr sz="2600" b="1"/>
+              <a:defRPr sz="2800" b="1"/>
             </a:pPr>
             <a:r>
               <a:t>Types of Wild Animals</a:t>
@@ -3252,8 +4107,8 @@
         </p:nvSpPr>
         <p:spPr>
           <a:xfrm>
-            <a:off x="640080" y="1463040"/>
-            <a:ext cx="7863840" cy="4389120"/>
+            <a:off x="365760" y="1097280"/>
+            <a:ext cx="3840480" cy="4114800"/>
           </a:xfrm>
           <a:prstGeom prst="rect">
             <a:avLst/>
@@ -3262,82 +4117,68 @@
         </p:spPr>
         <p:txBody>
           <a:bodyPr wrap="square">
-            <a:noAutofit/>
+            <a:spAutoFit/>
           </a:bodyPr>
           <a:lstStyle/>
           <a:p/>
           <a:p>
             <a:pPr>
-              <a:lnSpc>
-                <a:spcPct val="115000"/>
-              </a:lnSpc>
-              <a:spcAft>
-                <a:spcPts val="600"/>
-              </a:spcAft>
-              <a:defRPr sz="2000"/>
-            </a:pPr>
-            <a:r>
-              <a:t>• Mammals, such as lions, elephants, and bears, are a diverse group of wild animals that can be found in various habitats around the world.</a:t>
-            </a:r>
-          </a:p>
-          <a:p>
-            <a:pPr>
-              <a:lnSpc>
-                <a:spcPct val="115000"/>
-              </a:lnSpc>
-              <a:spcAft>
-                <a:spcPts val="600"/>
-              </a:spcAft>
-              <a:defRPr sz="2000"/>
-            </a:pPr>
-            <a:r>
-              <a:t>• Birds, including eagles, parrots, and penguins, are another significant group of wild animals, with many species facing threats such as habitat destruction and hunting.</a:t>
-            </a:r>
-          </a:p>
-          <a:p>
-            <a:pPr>
-              <a:lnSpc>
-                <a:spcPct val="115000"/>
-              </a:lnSpc>
-              <a:spcAft>
-                <a:spcPts val="600"/>
-              </a:spcAft>
-              <a:defRPr sz="2000"/>
-            </a:pPr>
-            <a:r>
-              <a:t>• Reptiles, like snakes, crocodiles, and turtles, are often misunderstood and play a vital role in maintaining the balance of their ecosystems.</a:t>
-            </a:r>
-          </a:p>
-          <a:p>
-            <a:pPr>
-              <a:lnSpc>
-                <a:spcPct val="115000"/>
-              </a:lnSpc>
-              <a:spcAft>
-                <a:spcPts val="600"/>
-              </a:spcAft>
-              <a:defRPr sz="2000"/>
-            </a:pPr>
-            <a:r>
-              <a:t>• Fish and other aquatic animals, such as dolphins and whales, are also an essential part of the world's wild animal population, with many species facing threats from pollution and overfishing.</a:t>
-            </a:r>
-          </a:p>
-          <a:p>
-            <a:pPr>
-              <a:lnSpc>
-                <a:spcPct val="115000"/>
-              </a:lnSpc>
-              <a:spcAft>
-                <a:spcPts val="600"/>
-              </a:spcAft>
-              <a:defRPr sz="2000"/>
-            </a:pPr>
-            <a:r>
-              <a:t>• The classification of wild animals into these categories helps us better understand their characteristics, habits, and conservation needs.</a:t>
-            </a:r>
-          </a:p>
-        </p:txBody>
-      </p:sp>
+              <a:defRPr sz="1600"/>
+            </a:pPr>
+            <a:r>
+              <a:t>• Mammals, such as lions, elephants, and bears, are a diverse group of wild animals that can be found in different parts of the world.</a:t>
+            </a:r>
+          </a:p>
+          <a:p>
+            <a:pPr>
+              <a:defRPr sz="1600"/>
+            </a:pPr>
+            <a:r>
+              <a:t>• Birds, including eagles, parrots, and penguins, are another category of wild animals that are known for their unique characteristics and abilities.</a:t>
+            </a:r>
+          </a:p>
+          <a:p>
+            <a:pPr>
+              <a:defRPr sz="1600"/>
+            </a:pPr>
+            <a:r>
+              <a:t>• Reptiles, like snakes, crocodiles, and turtles, are often misunderstood but play a vital role in the ecosystem.</a:t>
+            </a:r>
+          </a:p>
+          <a:p>
+            <a:pPr>
+              <a:defRPr sz="1600"/>
+            </a:pPr>
+            <a:r>
+              <a:t>• The classification of wild animals is crucial for understanding their behavior, habitat, and conservation status.</a:t>
+            </a:r>
+          </a:p>
+        </p:txBody>
+      </p:sp>
+      <p:pic>
+        <p:nvPicPr>
+          <p:cNvPr id="4" name="Picture 3" descr="image.jpg"/>
+          <p:cNvPicPr>
+            <a:picLocks noChangeAspect="1"/>
+          </p:cNvPicPr>
+          <p:nvPr/>
+        </p:nvPicPr>
+        <p:blipFill>
+          <a:blip r:embed="rId2"/>
+          <a:stretch>
+            <a:fillRect/>
+          </a:stretch>
+        </p:blipFill>
+        <p:spPr>
+          <a:xfrm>
+            <a:off x="4937760" y="1097280"/>
+            <a:ext cx="2613586" cy="3657600"/>
+          </a:xfrm>
+          <a:prstGeom prst="rect">
+            <a:avLst/>
+          </a:prstGeom>
+        </p:spPr>
+      </p:pic>
     </p:spTree>
   </p:cSld>
   <p:clrMapOvr>
@@ -3364,8 +4205,8 @@
         </p:nvSpPr>
         <p:spPr>
           <a:xfrm>
-            <a:off x="365760" y="274320"/>
-            <a:ext cx="8229600" cy="731520"/>
+            <a:off x="457200" y="365760"/>
+            <a:ext cx="8229600" cy="822960"/>
           </a:xfrm>
           <a:prstGeom prst="rect">
             <a:avLst/>
@@ -3374,15 +4215,15 @@
         </p:spPr>
         <p:txBody>
           <a:bodyPr wrap="none">
-            <a:spAutoFit/>
+            <a:noAutofit/>
           </a:bodyPr>
           <a:lstStyle/>
           <a:p>
             <a:pPr>
-              <a:defRPr sz="2800" b="1"/>
-            </a:pPr>
-            <a:r>
-              <a:t>Habitats of Wild Animals</a:t>
+              <a:defRPr sz="2600" b="1"/>
+            </a:pPr>
+            <a:r>
+              <a:t>Habitat and Distribution</a:t>
             </a:r>
           </a:p>
         </p:txBody>
@@ -3395,8 +4236,8 @@
         </p:nvSpPr>
         <p:spPr>
           <a:xfrm>
-            <a:off x="365760" y="1097280"/>
-            <a:ext cx="3840480" cy="4114800"/>
+            <a:off x="640080" y="1463040"/>
+            <a:ext cx="7863840" cy="4389120"/>
           </a:xfrm>
           <a:prstGeom prst="rect">
             <a:avLst/>
@@ -3405,76 +4246,68 @@
         </p:spPr>
         <p:txBody>
           <a:bodyPr wrap="square">
-            <a:spAutoFit/>
+            <a:noAutofit/>
           </a:bodyPr>
           <a:lstStyle/>
           <a:p/>
           <a:p>
             <a:pPr>
-              <a:defRPr sz="1600"/>
-            </a:pPr>
-            <a:r>
-              <a:t>• Forests, including tropical rainforests and boreal forests, provide habitat for a vast array of wild animals, from insects to large mammals.</a:t>
-            </a:r>
-          </a:p>
-          <a:p>
-            <a:pPr>
-              <a:defRPr sz="1600"/>
-            </a:pPr>
-            <a:r>
-              <a:t>• Grasslands, such as savannas and prairies, are home to many iconic wild animals, including lions, zebras, and bison.</a:t>
-            </a:r>
-          </a:p>
-          <a:p>
-            <a:pPr>
-              <a:defRPr sz="1600"/>
-            </a:pPr>
-            <a:r>
-              <a:t>• Deserts, like the Sahara and Mojave, support a unique range of adapted wild animals, such as camels, snakes, and lizards.</a:t>
-            </a:r>
-          </a:p>
-          <a:p>
-            <a:pPr>
-              <a:defRPr sz="1600"/>
-            </a:pPr>
-            <a:r>
-              <a:t>• Oceans and other aquatic ecosystems, including coral reefs and estuaries, are home to a diverse range of wild animals, from tiny plankton to massive blue whales.</a:t>
-            </a:r>
-          </a:p>
-          <a:p>
-            <a:pPr>
-              <a:defRPr sz="1600"/>
-            </a:pPr>
-            <a:r>
-              <a:t>• Understanding the different habitats of wild animals is crucial for developing effective conservation strategies.</a:t>
-            </a:r>
-          </a:p>
-        </p:txBody>
-      </p:sp>
-      <p:pic>
-        <p:nvPicPr>
-          <p:cNvPr id="4" name="Picture 3" descr="image.jpg"/>
-          <p:cNvPicPr>
-            <a:picLocks noChangeAspect="1"/>
-          </p:cNvPicPr>
-          <p:nvPr/>
-        </p:nvPicPr>
-        <p:blipFill>
-          <a:blip r:embed="rId2"/>
-          <a:stretch>
-            <a:fillRect/>
-          </a:stretch>
-        </p:blipFill>
-        <p:spPr>
-          <a:xfrm>
-            <a:off x="4937760" y="1097280"/>
-            <a:ext cx="3657600" cy="2438400"/>
-          </a:xfrm>
-          <a:prstGeom prst="rect">
-            <a:avLst/>
-          </a:prstGeom>
-        </p:spPr>
-      </p:pic>
+              <a:lnSpc>
+                <a:spcPct val="115000"/>
+              </a:lnSpc>
+              <a:spcAft>
+                <a:spcPts val="600"/>
+              </a:spcAft>
+              <a:defRPr sz="2000"/>
+            </a:pPr>
+            <a:r>
+              <a:t>• Wild animals can be found in various habitats, including forests, grasslands, deserts, and oceans.</a:t>
+            </a:r>
+          </a:p>
+          <a:p>
+            <a:pPr>
+              <a:lnSpc>
+                <a:spcPct val="115000"/>
+              </a:lnSpc>
+              <a:spcAft>
+                <a:spcPts val="600"/>
+              </a:spcAft>
+              <a:defRPr sz="2000"/>
+            </a:pPr>
+            <a:r>
+              <a:t>• The geographic distribution of wild animals is influenced by factors such as climate, food availability, and predation.</a:t>
+            </a:r>
+          </a:p>
+          <a:p>
+            <a:pPr>
+              <a:lnSpc>
+                <a:spcPct val="115000"/>
+              </a:lnSpc>
+              <a:spcAft>
+                <a:spcPts val="600"/>
+              </a:spcAft>
+              <a:defRPr sz="2000"/>
+            </a:pPr>
+            <a:r>
+              <a:t>• Human activities, like deforestation and pollution, have significantly impacted the habitats and distribution of wild animals.</a:t>
+            </a:r>
+          </a:p>
+          <a:p>
+            <a:pPr>
+              <a:lnSpc>
+                <a:spcPct val="115000"/>
+              </a:lnSpc>
+              <a:spcAft>
+                <a:spcPts val="600"/>
+              </a:spcAft>
+              <a:defRPr sz="2000"/>
+            </a:pPr>
+            <a:r>
+              <a:t>• Understanding the habitat and distribution of wild animals is essential for developing effective conservation strategies.</a:t>
+            </a:r>
+          </a:p>
+        </p:txBody>
+      </p:sp>
     </p:spTree>
   </p:cSld>
   <p:clrMapOvr>
@@ -3501,8 +4334,8 @@
         </p:nvSpPr>
         <p:spPr>
           <a:xfrm>
-            <a:off x="457200" y="365760"/>
-            <a:ext cx="8229600" cy="822960"/>
+            <a:off x="365760" y="274320"/>
+            <a:ext cx="8229600" cy="731520"/>
           </a:xfrm>
           <a:prstGeom prst="rect">
             <a:avLst/>
@@ -3511,15 +4344,15 @@
         </p:spPr>
         <p:txBody>
           <a:bodyPr wrap="none">
-            <a:noAutofit/>
+            <a:spAutoFit/>
           </a:bodyPr>
           <a:lstStyle/>
           <a:p>
             <a:pPr>
-              <a:defRPr sz="2600" b="1"/>
-            </a:pPr>
-            <a:r>
-              <a:t>Threats to Wild Animals</a:t>
+              <a:defRPr sz="2800" b="1"/>
+            </a:pPr>
+            <a:r>
+              <a:t>Adaptation and Survival</a:t>
             </a:r>
           </a:p>
         </p:txBody>
@@ -3532,8 +4365,8 @@
         </p:nvSpPr>
         <p:spPr>
           <a:xfrm>
-            <a:off x="640080" y="1463040"/>
-            <a:ext cx="7863840" cy="4389120"/>
+            <a:off x="365760" y="1097280"/>
+            <a:ext cx="3840480" cy="4114800"/>
           </a:xfrm>
           <a:prstGeom prst="rect">
             <a:avLst/>
@@ -3542,82 +4375,68 @@
         </p:spPr>
         <p:txBody>
           <a:bodyPr wrap="square">
-            <a:noAutofit/>
+            <a:spAutoFit/>
           </a:bodyPr>
           <a:lstStyle/>
           <a:p/>
           <a:p>
             <a:pPr>
-              <a:lnSpc>
-                <a:spcPct val="115000"/>
-              </a:lnSpc>
-              <a:spcAft>
-                <a:spcPts val="600"/>
-              </a:spcAft>
-              <a:defRPr sz="2000"/>
-            </a:pPr>
-            <a:r>
-              <a:t>• Habitat destruction and fragmentation, often caused by human activities such as deforestation and urbanization, pose a significant threat to the survival of many wild animal species.</a:t>
-            </a:r>
-          </a:p>
-          <a:p>
-            <a:pPr>
-              <a:lnSpc>
-                <a:spcPct val="115000"/>
-              </a:lnSpc>
-              <a:spcAft>
-                <a:spcPts val="600"/>
-              </a:spcAft>
-              <a:defRPr sz="2000"/>
-            </a:pPr>
-            <a:r>
-              <a:t>• Climate change, which alters ecosystems and disrupts food chains, is another major threat to wild animals, with many species struggling to adapt to changing environmental conditions.</a:t>
-            </a:r>
-          </a:p>
-          <a:p>
-            <a:pPr>
-              <a:lnSpc>
-                <a:spcPct val="115000"/>
-              </a:lnSpc>
-              <a:spcAft>
-                <a:spcPts val="600"/>
-              </a:spcAft>
-              <a:defRPr sz="2000"/>
-            </a:pPr>
-            <a:r>
-              <a:t>• Pollution, including plastic pollution, chemical runoff, and noise pollution, has a devastating impact on wild animals, from entanglement and ingestion to disruption of communication and behavior.</a:t>
-            </a:r>
-          </a:p>
-          <a:p>
-            <a:pPr>
-              <a:lnSpc>
-                <a:spcPct val="115000"/>
-              </a:lnSpc>
-              <a:spcAft>
-                <a:spcPts val="600"/>
-              </a:spcAft>
-              <a:defRPr sz="2000"/>
-            </a:pPr>
-            <a:r>
-              <a:t>• Overhunting and poaching, driven by demand for wild animal products such as ivory, rhino horn, and fur, are major contributors to the decline of many wild animal populations.</a:t>
-            </a:r>
-          </a:p>
-          <a:p>
-            <a:pPr>
-              <a:lnSpc>
-                <a:spcPct val="115000"/>
-              </a:lnSpc>
-              <a:spcAft>
-                <a:spcPts val="600"/>
-              </a:spcAft>
-              <a:defRPr sz="2000"/>
-            </a:pPr>
-            <a:r>
-              <a:t>• Addressing these threats is essential for the conservation of wild animals and the preservation of ecosystem health.</a:t>
-            </a:r>
-          </a:p>
-        </p:txBody>
-      </p:sp>
+              <a:defRPr sz="1600"/>
+            </a:pPr>
+            <a:r>
+              <a:t>• Wild animals have evolved unique adaptations to survive in their environments, such as camouflage, migration, and hibernation.</a:t>
+            </a:r>
+          </a:p>
+          <a:p>
+            <a:pPr>
+              <a:defRPr sz="1600"/>
+            </a:pPr>
+            <a:r>
+              <a:t>• These adaptations enable them to find food, avoid predators, and regulate their body temperature.</a:t>
+            </a:r>
+          </a:p>
+          <a:p>
+            <a:pPr>
+              <a:defRPr sz="1600"/>
+            </a:pPr>
+            <a:r>
+              <a:t>• The ability of wild animals to adapt to changing environments is crucial for their survival and the maintenance of ecosystem balance.</a:t>
+            </a:r>
+          </a:p>
+          <a:p>
+            <a:pPr>
+              <a:defRPr sz="1600"/>
+            </a:pPr>
+            <a:r>
+              <a:t>• Studying the adaptations of wild animals can provide valuable insights into the natural world and inspire innovative solutions.</a:t>
+            </a:r>
+          </a:p>
+        </p:txBody>
+      </p:sp>
+      <p:pic>
+        <p:nvPicPr>
+          <p:cNvPr id="4" name="Picture 3" descr="image.jpg"/>
+          <p:cNvPicPr>
+            <a:picLocks noChangeAspect="1"/>
+          </p:cNvPicPr>
+          <p:nvPr/>
+        </p:nvPicPr>
+        <p:blipFill>
+          <a:blip r:embed="rId2"/>
+          <a:stretch>
+            <a:fillRect/>
+          </a:stretch>
+        </p:blipFill>
+        <p:spPr>
+          <a:xfrm>
+            <a:off x="4937760" y="1097280"/>
+            <a:ext cx="3657600" cy="1828800"/>
+          </a:xfrm>
+          <a:prstGeom prst="rect">
+            <a:avLst/>
+          </a:prstGeom>
+        </p:spPr>
+      </p:pic>
     </p:spTree>
   </p:cSld>
   <p:clrMapOvr>
@@ -3662,7 +4481,7 @@
               <a:defRPr sz="2800" b="1"/>
             </a:pPr>
             <a:r>
-              <a:t>Conservation Efforts</a:t>
+              <a:t>Conservation Status</a:t>
             </a:r>
           </a:p>
         </p:txBody>
@@ -3694,7 +4513,7 @@
               <a:defRPr sz="1600"/>
             </a:pPr>
             <a:r>
-              <a:t>• National parks and protected areas provide a safe haven for many wild animal species, allowing them to thrive in their natural habitats.</a:t>
+              <a:t>• Many wild animals are facing threats to their survival, including habitat loss, poaching, and climate change.</a:t>
             </a:r>
           </a:p>
           <a:p>
@@ -3702,7 +4521,7 @@
               <a:defRPr sz="1600"/>
             </a:pPr>
             <a:r>
-              <a:t>• Conservation organizations, such as the World Wildlife Fund and the International Union for Conservation of Nature, work tirelessly to protect wild animals and their habitats.</a:t>
+              <a:t>• The conservation status of wild animals is often classified as endangered, vulnerable, or threatened, depending on the level of risk.</a:t>
             </a:r>
           </a:p>
           <a:p>
@@ -3710,7 +4529,7 @@
               <a:defRPr sz="1600"/>
             </a:pPr>
             <a:r>
-              <a:t>• Community-based conservation initiatives, which engage local people in the conservation process, have been shown to be effective in promoting the protection of wild animals and their habitats.</a:t>
+              <a:t>• Efforts to conserve wild animals, such as protected areas and anti-poaching laws, are essential for maintaining biodiversity.</a:t>
             </a:r>
           </a:p>
           <a:p>
@@ -3718,15 +4537,7 @@
               <a:defRPr sz="1600"/>
             </a:pPr>
             <a:r>
-              <a:t>• Research and monitoring programs, which study wild animal populations and their habitats, are essential for developing effective conservation strategies and evaluating the impact of conservation efforts.</a:t>
-            </a:r>
-          </a:p>
-          <a:p>
-            <a:pPr>
-              <a:defRPr sz="1600"/>
-            </a:pPr>
-            <a:r>
-              <a:t>• By supporting conservation efforts, we can help ensure the long-term survival of wild animals and the ecosystems they inhabit.</a:t>
+              <a:t>• The conservation status of wild animals is a critical indicator of the health of our planet and requires immediate attention.</a:t>
             </a:r>
           </a:p>
         </p:txBody>
@@ -3748,7 +4559,7 @@
         <p:spPr>
           <a:xfrm>
             <a:off x="4937760" y="1097280"/>
-            <a:ext cx="3657600" cy="2417673"/>
+            <a:ext cx="3657600" cy="2137410"/>
           </a:xfrm>
           <a:prstGeom prst="rect">
             <a:avLst/>
@@ -3799,7 +4610,7 @@
               <a:defRPr sz="2600" b="1"/>
             </a:pPr>
             <a:r>
-              <a:t>Importance of Wild Animals</a:t>
+              <a:t>Endangered Species</a:t>
             </a:r>
           </a:p>
         </p:txBody>
@@ -3837,7 +4648,7 @@
               <a:defRPr sz="2000"/>
             </a:pPr>
             <a:r>
-              <a:t>• Wild animals play a crucial role in maintaining ecosystem health, contributing to processes such as seed dispersal, pollination, and nutrient cycling.</a:t>
+              <a:t>• Endangered species, like the giant panda, mountain gorilla, and blue whale, are at high risk of extinction due to human activities.</a:t>
             </a:r>
           </a:p>
           <a:p>
@@ -3851,7 +4662,7 @@
               <a:defRPr sz="2000"/>
             </a:pPr>
             <a:r>
-              <a:t>• They also provide important ecosystem services, including pest control, climate regulation, and water filtration.</a:t>
+              <a:t>• The loss of these species can have significant impacts on ecosystem function and human well-being.</a:t>
             </a:r>
           </a:p>
           <a:p>
@@ -3865,7 +4676,7 @@
               <a:defRPr sz="2000"/>
             </a:pPr>
             <a:r>
-              <a:t>• Wild animals have significant cultural and spiritual value, featuring prominently in the mythology, art, and literature of many societies.</a:t>
+              <a:t>• Conservation efforts, such as captive breeding programs and habitat restoration, are necessary to protect endangered species.</a:t>
             </a:r>
           </a:p>
           <a:p>
@@ -3879,21 +4690,7 @@
               <a:defRPr sz="2000"/>
             </a:pPr>
             <a:r>
-              <a:t>• Additionally, wild animals can provide valuable insights into the natural world, helping us to better understand the complex relationships between species and their environments.</a:t>
-            </a:r>
-          </a:p>
-          <a:p>
-            <a:pPr>
-              <a:lnSpc>
-                <a:spcPct val="115000"/>
-              </a:lnSpc>
-              <a:spcAft>
-                <a:spcPts val="600"/>
-              </a:spcAft>
-              <a:defRPr sz="2000"/>
-            </a:pPr>
-            <a:r>
-              <a:t>• By appreciating the importance of wild animals, we can work to ensure their conservation and the preservation of the ecosystems they inhabit.</a:t>
+              <a:t>• The preservation of endangered species is a moral and ecological imperative that requires international cooperation.</a:t>
             </a:r>
           </a:p>
         </p:txBody>
@@ -3924,8 +4721,8 @@
         </p:nvSpPr>
         <p:spPr>
           <a:xfrm>
-            <a:off x="365760" y="274320"/>
-            <a:ext cx="8229600" cy="731520"/>
+            <a:off x="457200" y="365760"/>
+            <a:ext cx="8229600" cy="822960"/>
           </a:xfrm>
           <a:prstGeom prst="rect">
             <a:avLst/>
@@ -3934,15 +4731,15 @@
         </p:spPr>
         <p:txBody>
           <a:bodyPr wrap="none">
-            <a:spAutoFit/>
+            <a:noAutofit/>
           </a:bodyPr>
           <a:lstStyle/>
           <a:p>
             <a:pPr>
-              <a:defRPr sz="2800" b="1"/>
-            </a:pPr>
-            <a:r>
-              <a:t>Conclusion</a:t>
+              <a:defRPr sz="2600" b="1"/>
+            </a:pPr>
+            <a:r>
+              <a:t>Threats to Wild Animals</a:t>
             </a:r>
           </a:p>
         </p:txBody>
@@ -3955,8 +4752,8 @@
         </p:nvSpPr>
         <p:spPr>
           <a:xfrm>
-            <a:off x="365760" y="1097280"/>
-            <a:ext cx="3840480" cy="4114800"/>
+            <a:off x="640080" y="1463040"/>
+            <a:ext cx="7863840" cy="4389120"/>
           </a:xfrm>
           <a:prstGeom prst="rect">
             <a:avLst/>
@@ -3965,76 +4762,68 @@
         </p:spPr>
         <p:txBody>
           <a:bodyPr wrap="square">
-            <a:spAutoFit/>
+            <a:noAutofit/>
           </a:bodyPr>
           <a:lstStyle/>
           <a:p/>
           <a:p>
             <a:pPr>
-              <a:defRPr sz="1600"/>
-            </a:pPr>
-            <a:r>
-              <a:t>• In conclusion, wild animals are an integral part of our planet's ecosystem, playing a vital role in maintaining the balance of nature.</a:t>
-            </a:r>
-          </a:p>
-          <a:p>
-            <a:pPr>
-              <a:defRPr sz="1600"/>
-            </a:pPr>
-            <a:r>
-              <a:t>• The preservation of wild animals is essential for the health of our planet, and it is our responsibility to take action to protect them.</a:t>
-            </a:r>
-          </a:p>
-          <a:p>
-            <a:pPr>
-              <a:defRPr sz="1600"/>
-            </a:pPr>
-            <a:r>
-              <a:t>• By supporting conservation efforts, reducing our impact on the environment, and promoting sustainable practices, we can help ensure the long-term survival of wild animals and the ecosystems they inhabit.</a:t>
-            </a:r>
-          </a:p>
-          <a:p>
-            <a:pPr>
-              <a:defRPr sz="1600"/>
-            </a:pPr>
-            <a:r>
-              <a:t>• Ultimately, the conservation of wild animals requires a collective effort, and it is up to us to take action and make a positive impact on the world around us.</a:t>
-            </a:r>
-          </a:p>
-          <a:p>
-            <a:pPr>
-              <a:defRPr sz="1600"/>
-            </a:pPr>
-            <a:r>
-              <a:t>• By working together, we can create a future where wild animals continue to thrive and inspire future generations.</a:t>
-            </a:r>
-          </a:p>
-        </p:txBody>
-      </p:sp>
-      <p:pic>
-        <p:nvPicPr>
-          <p:cNvPr id="4" name="Picture 3" descr="image.jpg"/>
-          <p:cNvPicPr>
-            <a:picLocks noChangeAspect="1"/>
-          </p:cNvPicPr>
-          <p:nvPr/>
-        </p:nvPicPr>
-        <p:blipFill>
-          <a:blip r:embed="rId2"/>
-          <a:stretch>
-            <a:fillRect/>
-          </a:stretch>
-        </p:blipFill>
-        <p:spPr>
-          <a:xfrm>
-            <a:off x="4937760" y="1097280"/>
-            <a:ext cx="3657600" cy="3089853"/>
-          </a:xfrm>
-          <a:prstGeom prst="rect">
-            <a:avLst/>
-          </a:prstGeom>
-        </p:spPr>
-      </p:pic>
+              <a:lnSpc>
+                <a:spcPct val="115000"/>
+              </a:lnSpc>
+              <a:spcAft>
+                <a:spcPts val="600"/>
+              </a:spcAft>
+              <a:defRPr sz="2000"/>
+            </a:pPr>
+            <a:r>
+              <a:t>• Habitat destruction and fragmentation are major threats to wild animals, as they lead to population isolation and reduced resources.</a:t>
+            </a:r>
+          </a:p>
+          <a:p>
+            <a:pPr>
+              <a:lnSpc>
+                <a:spcPct val="115000"/>
+              </a:lnSpc>
+              <a:spcAft>
+                <a:spcPts val="600"/>
+              </a:spcAft>
+              <a:defRPr sz="2000"/>
+            </a:pPr>
+            <a:r>
+              <a:t>• Pollution, including plastic pollution, climate change, and noise pollution, can have devastating effects on wild animals and their habitats.</a:t>
+            </a:r>
+          </a:p>
+          <a:p>
+            <a:pPr>
+              <a:lnSpc>
+                <a:spcPct val="115000"/>
+              </a:lnSpc>
+              <a:spcAft>
+                <a:spcPts val="600"/>
+              </a:spcAft>
+              <a:defRPr sz="2000"/>
+            </a:pPr>
+            <a:r>
+              <a:t>• Human-wildlife conflict, such as poaching and crop damage, is a significant threat to wild animals and requires effective management strategies.</a:t>
+            </a:r>
+          </a:p>
+          <a:p>
+            <a:pPr>
+              <a:lnSpc>
+                <a:spcPct val="115000"/>
+              </a:lnSpc>
+              <a:spcAft>
+                <a:spcPts val="600"/>
+              </a:spcAft>
+              <a:defRPr sz="2000"/>
+            </a:pPr>
+            <a:r>
+              <a:t>• Addressing these threats is essential for the long-term survival of wild animals and the maintenance of ecosystem services.</a:t>
+            </a:r>
+          </a:p>
+        </p:txBody>
+      </p:sp>
     </p:spTree>
   </p:cSld>
   <p:clrMapOvr>
@@ -4079,7 +4868,7 @@
               <a:defRPr sz="2600" b="1"/>
             </a:pPr>
             <a:r>
-              <a:t>Thank You</a:t>
+              <a:t>Human-Wildlife Conflict</a:t>
             </a:r>
           </a:p>
         </p:txBody>
@@ -4106,8 +4895,193 @@
           </a:bodyPr>
           <a:lstStyle/>
           <a:p/>
-        </p:txBody>
-      </p:sp>
+          <a:p>
+            <a:pPr>
+              <a:lnSpc>
+                <a:spcPct val="115000"/>
+              </a:lnSpc>
+              <a:spcAft>
+                <a:spcPts val="600"/>
+              </a:spcAft>
+              <a:defRPr sz="2000"/>
+            </a:pPr>
+            <a:r>
+              <a:t>• Human-wildlife conflict arises when the interests of humans and wild animals clash, resulting in negative impacts on both parties.</a:t>
+            </a:r>
+          </a:p>
+          <a:p>
+            <a:pPr>
+              <a:lnSpc>
+                <a:spcPct val="115000"/>
+              </a:lnSpc>
+              <a:spcAft>
+                <a:spcPts val="600"/>
+              </a:spcAft>
+              <a:defRPr sz="2000"/>
+            </a:pPr>
+            <a:r>
+              <a:t>• Conflicts can occur due to competition for resources, such as food and water, or due to perceived threats, like attacks on livestock.</a:t>
+            </a:r>
+          </a:p>
+          <a:p>
+            <a:pPr>
+              <a:lnSpc>
+                <a:spcPct val="115000"/>
+              </a:lnSpc>
+              <a:spcAft>
+                <a:spcPts val="600"/>
+              </a:spcAft>
+              <a:defRPr sz="2000"/>
+            </a:pPr>
+            <a:r>
+              <a:t>• Effective management of human-wildlife conflict requires a comprehensive approach that considers the needs of both humans and wild animals.</a:t>
+            </a:r>
+          </a:p>
+          <a:p>
+            <a:pPr>
+              <a:lnSpc>
+                <a:spcPct val="115000"/>
+              </a:lnSpc>
+              <a:spcAft>
+                <a:spcPts val="600"/>
+              </a:spcAft>
+              <a:defRPr sz="2000"/>
+            </a:pPr>
+            <a:r>
+              <a:t>• Resolving human-wildlife conflict is crucial for promoting coexistence and reducing the risk of extinction.</a:t>
+            </a:r>
+          </a:p>
+        </p:txBody>
+      </p:sp>
+    </p:spTree>
+  </p:cSld>
+  <p:clrMapOvr>
+    <a:masterClrMapping/>
+  </p:clrMapOvr>
+</p:sld>
+</file>
+
+<file path=ppt/slides/slide9.xml><?xml version="1.0" encoding="utf-8"?>
+<p:sld xmlns:a="http://schemas.openxmlformats.org/drawingml/2006/main" xmlns:p="http://schemas.openxmlformats.org/presentationml/2006/main" xmlns:r="http://schemas.openxmlformats.org/officeDocument/2006/relationships">
+  <p:cSld>
+    <p:spTree>
+      <p:nvGrpSpPr>
+        <p:cNvPr id="1" name=""/>
+        <p:cNvGrpSpPr/>
+        <p:nvPr/>
+      </p:nvGrpSpPr>
+      <p:grpSpPr/>
+      <p:sp>
+        <p:nvSpPr>
+          <p:cNvPr id="2" name="TextBox 1"/>
+          <p:cNvSpPr txBox="1"/>
+          <p:nvPr/>
+        </p:nvSpPr>
+        <p:spPr>
+          <a:xfrm>
+            <a:off x="365760" y="274320"/>
+            <a:ext cx="8229600" cy="731520"/>
+          </a:xfrm>
+          <a:prstGeom prst="rect">
+            <a:avLst/>
+          </a:prstGeom>
+          <a:noFill/>
+        </p:spPr>
+        <p:txBody>
+          <a:bodyPr wrap="none">
+            <a:spAutoFit/>
+          </a:bodyPr>
+          <a:lstStyle/>
+          <a:p>
+            <a:pPr>
+              <a:defRPr sz="2800" b="1"/>
+            </a:pPr>
+            <a:r>
+              <a:t>Wildlife Conservation Efforts</a:t>
+            </a:r>
+          </a:p>
+        </p:txBody>
+      </p:sp>
+      <p:sp>
+        <p:nvSpPr>
+          <p:cNvPr id="3" name="TextBox 2"/>
+          <p:cNvSpPr txBox="1"/>
+          <p:nvPr/>
+        </p:nvSpPr>
+        <p:spPr>
+          <a:xfrm>
+            <a:off x="365760" y="1097280"/>
+            <a:ext cx="3840480" cy="4114800"/>
+          </a:xfrm>
+          <a:prstGeom prst="rect">
+            <a:avLst/>
+          </a:prstGeom>
+          <a:noFill/>
+        </p:spPr>
+        <p:txBody>
+          <a:bodyPr wrap="square">
+            <a:spAutoFit/>
+          </a:bodyPr>
+          <a:lstStyle/>
+          <a:p/>
+          <a:p>
+            <a:pPr>
+              <a:defRPr sz="1600"/>
+            </a:pPr>
+            <a:r>
+              <a:t>• Protected areas, such as national parks and wildlife reserves, provide a safe habitat for wild animals and help to maintain ecosystem balance.</a:t>
+            </a:r>
+          </a:p>
+          <a:p>
+            <a:pPr>
+              <a:defRPr sz="1600"/>
+            </a:pPr>
+            <a:r>
+              <a:t>• Conservation organizations, like the World Wildlife Fund, work to protect wild animals and their habitats through research, education, and advocacy.</a:t>
+            </a:r>
+          </a:p>
+          <a:p>
+            <a:pPr>
+              <a:defRPr sz="1600"/>
+            </a:pPr>
+            <a:r>
+              <a:t>• Community-based conservation initiatives, which involve local people in conservation efforts, can be effective in promoting the protection of wild animals.</a:t>
+            </a:r>
+          </a:p>
+          <a:p>
+            <a:pPr>
+              <a:defRPr sz="1600"/>
+            </a:pPr>
+            <a:r>
+              <a:t>• Collaborative conservation efforts are necessary to address the complex challenges facing wild animals and their habitats.</a:t>
+            </a:r>
+          </a:p>
+        </p:txBody>
+      </p:sp>
+      <p:pic>
+        <p:nvPicPr>
+          <p:cNvPr id="4" name="Picture 3" descr="image.jpg"/>
+          <p:cNvPicPr>
+            <a:picLocks noChangeAspect="1"/>
+          </p:cNvPicPr>
+          <p:nvPr/>
+        </p:nvPicPr>
+        <p:blipFill>
+          <a:blip r:embed="rId2"/>
+          <a:stretch>
+            <a:fillRect/>
+          </a:stretch>
+        </p:blipFill>
+        <p:spPr>
+          <a:xfrm>
+            <a:off x="4937760" y="1097280"/>
+            <a:ext cx="3657600" cy="2438400"/>
+          </a:xfrm>
+          <a:prstGeom prst="rect">
+            <a:avLst/>
+          </a:prstGeom>
+        </p:spPr>
+      </p:pic>
     </p:spTree>
   </p:cSld>
   <p:clrMapOvr>

</xml_diff>